<commit_message>
Exercício 5 - Relação entre Viés e Variância em Python
</commit_message>
<xml_diff>
--- a/machine-learning/notations/semana-6/presentation/10-ml-system-design.pptx
+++ b/machine-learning/notations/semana-6/presentation/10-ml-system-design.pptx
@@ -228,7 +228,7 @@
           <a:p>
             <a:fld id="{C9B18D6F-3F04-4D10-8652-60C42ED2C305}" type="datetimeFigureOut">
               <a:rPr lang="pt-BR" smtClean="0"/>
-              <a:t>29/01/2019</a:t>
+              <a:t>19/04/2019</a:t>
             </a:fld>
             <a:endParaRPr lang="pt-BR"/>
           </a:p>
@@ -18475,8 +18475,8 @@
           </a:p>
         </p:txBody>
       </p:sp>
-      <mc:AlternateContent xmlns:mc="http://schemas.openxmlformats.org/markup-compatibility/2006">
-        <mc:Choice xmlns:a14="http://schemas.microsoft.com/office/drawing/2010/main" Requires="a14">
+      <mc:AlternateContent xmlns:mc="http://schemas.openxmlformats.org/markup-compatibility/2006" xmlns:a14="http://schemas.microsoft.com/office/drawing/2010/main">
+        <mc:Choice Requires="a14">
           <p:sp>
             <p:nvSpPr>
               <p:cNvPr id="9" name="Text Placeholder 2">
@@ -18747,7 +18747,7 @@
             </p:txBody>
           </p:sp>
         </mc:Choice>
-        <mc:Fallback>
+        <mc:Fallback xmlns="">
           <p:sp>
             <p:nvSpPr>
               <p:cNvPr id="9" name="Text Placeholder 2">
@@ -18792,8 +18792,8 @@
           </p:sp>
         </mc:Fallback>
       </mc:AlternateContent>
-      <mc:AlternateContent xmlns:mc="http://schemas.openxmlformats.org/markup-compatibility/2006">
-        <mc:Choice xmlns:a14="http://schemas.microsoft.com/office/drawing/2010/main" Requires="a14">
+      <mc:AlternateContent xmlns:mc="http://schemas.openxmlformats.org/markup-compatibility/2006" xmlns:a14="http://schemas.microsoft.com/office/drawing/2010/main">
+        <mc:Choice Requires="a14">
           <p:sp>
             <p:nvSpPr>
               <p:cNvPr id="8" name="CaixaDeTexto 7">
@@ -18947,7 +18947,7 @@
             </p:txBody>
           </p:sp>
         </mc:Choice>
-        <mc:Fallback>
+        <mc:Fallback xmlns="">
           <p:sp>
             <p:nvSpPr>
               <p:cNvPr id="8" name="CaixaDeTexto 7">
@@ -18992,8 +18992,8 @@
           </p:sp>
         </mc:Fallback>
       </mc:AlternateContent>
-      <mc:AlternateContent xmlns:mc="http://schemas.openxmlformats.org/markup-compatibility/2006">
-        <mc:Choice xmlns:a14="http://schemas.microsoft.com/office/drawing/2010/main" Requires="a14">
+      <mc:AlternateContent xmlns:mc="http://schemas.openxmlformats.org/markup-compatibility/2006" xmlns:a14="http://schemas.microsoft.com/office/drawing/2010/main">
+        <mc:Choice Requires="a14">
           <p:sp>
             <p:nvSpPr>
               <p:cNvPr id="12" name="CaixaDeTexto 11">
@@ -19147,7 +19147,7 @@
             </p:txBody>
           </p:sp>
         </mc:Choice>
-        <mc:Fallback>
+        <mc:Fallback xmlns="">
           <p:sp>
             <p:nvSpPr>
               <p:cNvPr id="12" name="CaixaDeTexto 11">
@@ -19192,8 +19192,8 @@
           </p:sp>
         </mc:Fallback>
       </mc:AlternateContent>
-      <mc:AlternateContent xmlns:mc="http://schemas.openxmlformats.org/markup-compatibility/2006">
-        <mc:Choice xmlns:a14="http://schemas.microsoft.com/office/drawing/2010/main" Requires="a14">
+      <mc:AlternateContent xmlns:mc="http://schemas.openxmlformats.org/markup-compatibility/2006" xmlns:a14="http://schemas.microsoft.com/office/drawing/2010/main">
+        <mc:Choice Requires="a14">
           <p:sp>
             <p:nvSpPr>
               <p:cNvPr id="10" name="Text Placeholder 2">
@@ -19441,7 +19441,7 @@
             </p:txBody>
           </p:sp>
         </mc:Choice>
-        <mc:Fallback>
+        <mc:Fallback xmlns="">
           <p:sp>
             <p:nvSpPr>
               <p:cNvPr id="10" name="Text Placeholder 2">
@@ -19486,8 +19486,8 @@
           </p:sp>
         </mc:Fallback>
       </mc:AlternateContent>
-      <mc:AlternateContent xmlns:mc="http://schemas.openxmlformats.org/markup-compatibility/2006">
-        <mc:Choice xmlns:a14="http://schemas.microsoft.com/office/drawing/2010/main" Requires="a14">
+      <mc:AlternateContent xmlns:mc="http://schemas.openxmlformats.org/markup-compatibility/2006" xmlns:a14="http://schemas.microsoft.com/office/drawing/2010/main">
+        <mc:Choice Requires="a14">
           <p:sp>
             <p:nvSpPr>
               <p:cNvPr id="13" name="Text Placeholder 2">
@@ -19735,7 +19735,7 @@
             </p:txBody>
           </p:sp>
         </mc:Choice>
-        <mc:Fallback>
+        <mc:Fallback xmlns="">
           <p:sp>
             <p:nvSpPr>
               <p:cNvPr id="13" name="Text Placeholder 2">
@@ -19780,8 +19780,8 @@
           </p:sp>
         </mc:Fallback>
       </mc:AlternateContent>
-      <mc:AlternateContent xmlns:mc="http://schemas.openxmlformats.org/markup-compatibility/2006">
-        <mc:Choice xmlns:a14="http://schemas.microsoft.com/office/drawing/2010/main" Requires="a14">
+      <mc:AlternateContent xmlns:mc="http://schemas.openxmlformats.org/markup-compatibility/2006" xmlns:a14="http://schemas.microsoft.com/office/drawing/2010/main">
+        <mc:Choice Requires="a14">
           <p:sp>
             <p:nvSpPr>
               <p:cNvPr id="14" name="Text Placeholder 2">
@@ -20031,7 +20031,7 @@
             </p:txBody>
           </p:sp>
         </mc:Choice>
-        <mc:Fallback>
+        <mc:Fallback xmlns="">
           <p:sp>
             <p:nvSpPr>
               <p:cNvPr id="14" name="Text Placeholder 2">
@@ -20184,8 +20184,8 @@
           </a:p>
         </p:txBody>
       </p:sp>
-      <mc:AlternateContent xmlns:mc="http://schemas.openxmlformats.org/markup-compatibility/2006">
-        <mc:Choice xmlns:a14="http://schemas.microsoft.com/office/drawing/2010/main" Requires="a14">
+      <mc:AlternateContent xmlns:mc="http://schemas.openxmlformats.org/markup-compatibility/2006" xmlns:a14="http://schemas.microsoft.com/office/drawing/2010/main">
+        <mc:Choice Requires="a14">
           <p:sp>
             <p:nvSpPr>
               <p:cNvPr id="5" name="CaixaDeTexto 4">
@@ -20214,6 +20214,7 @@
               </a:bodyPr>
               <a:lstStyle/>
               <a:p>
+                <a:pPr/>
                 <a14:m>
                   <m:oMathPara xmlns:m="http://schemas.openxmlformats.org/officeDocument/2006/math">
                     <m:oMathParaPr>
@@ -20234,7 +20235,7 @@
             </p:txBody>
           </p:sp>
         </mc:Choice>
-        <mc:Fallback>
+        <mc:Fallback xmlns="">
           <p:sp>
             <p:nvSpPr>
               <p:cNvPr id="5" name="CaixaDeTexto 4">
@@ -20279,8 +20280,8 @@
           </p:sp>
         </mc:Fallback>
       </mc:AlternateContent>
-      <mc:AlternateContent xmlns:mc="http://schemas.openxmlformats.org/markup-compatibility/2006">
-        <mc:Choice xmlns:a14="http://schemas.microsoft.com/office/drawing/2010/main" Requires="a14">
+      <mc:AlternateContent xmlns:mc="http://schemas.openxmlformats.org/markup-compatibility/2006" xmlns:a14="http://schemas.microsoft.com/office/drawing/2010/main">
+        <mc:Choice Requires="a14">
           <p:sp>
             <p:nvSpPr>
               <p:cNvPr id="17" name="CaixaDeTexto 16">
@@ -20309,6 +20310,7 @@
               </a:bodyPr>
               <a:lstStyle/>
               <a:p>
+                <a:pPr/>
                 <a14:m>
                   <m:oMathPara xmlns:m="http://schemas.openxmlformats.org/officeDocument/2006/math">
                     <m:oMathParaPr>
@@ -20329,7 +20331,7 @@
             </p:txBody>
           </p:sp>
         </mc:Choice>
-        <mc:Fallback>
+        <mc:Fallback xmlns="">
           <p:sp>
             <p:nvSpPr>
               <p:cNvPr id="17" name="CaixaDeTexto 16">
@@ -21200,8 +21202,8 @@
           </a:p>
         </p:txBody>
       </p:sp>
-      <mc:AlternateContent xmlns:mc="http://schemas.openxmlformats.org/markup-compatibility/2006">
-        <mc:Choice xmlns:a14="http://schemas.microsoft.com/office/drawing/2010/main" Requires="a14">
+      <mc:AlternateContent xmlns:mc="http://schemas.openxmlformats.org/markup-compatibility/2006" xmlns:a14="http://schemas.microsoft.com/office/drawing/2010/main">
+        <mc:Choice Requires="a14">
           <p:sp>
             <p:nvSpPr>
               <p:cNvPr id="26" name="Text Placeholder 2">
@@ -21393,7 +21395,7 @@
             </p:txBody>
           </p:sp>
         </mc:Choice>
-        <mc:Fallback>
+        <mc:Fallback xmlns="">
           <p:sp>
             <p:nvSpPr>
               <p:cNvPr id="26" name="Text Placeholder 2">
@@ -21438,8 +21440,8 @@
           </p:sp>
         </mc:Fallback>
       </mc:AlternateContent>
-      <mc:AlternateContent xmlns:mc="http://schemas.openxmlformats.org/markup-compatibility/2006">
-        <mc:Choice xmlns:a14="http://schemas.microsoft.com/office/drawing/2010/main" Requires="a14">
+      <mc:AlternateContent xmlns:mc="http://schemas.openxmlformats.org/markup-compatibility/2006" xmlns:a14="http://schemas.microsoft.com/office/drawing/2010/main">
+        <mc:Choice Requires="a14">
           <p:sp>
             <p:nvSpPr>
               <p:cNvPr id="27" name="Text Placeholder 2">
@@ -21631,7 +21633,7 @@
             </p:txBody>
           </p:sp>
         </mc:Choice>
-        <mc:Fallback>
+        <mc:Fallback xmlns="">
           <p:sp>
             <p:nvSpPr>
               <p:cNvPr id="27" name="Text Placeholder 2">
@@ -24110,8 +24112,8 @@
           </a:p>
         </p:txBody>
       </p:sp>
-      <mc:AlternateContent xmlns:mc="http://schemas.openxmlformats.org/markup-compatibility/2006">
-        <mc:Choice xmlns:a14="http://schemas.microsoft.com/office/drawing/2010/main" Requires="a14">
+      <mc:AlternateContent xmlns:mc="http://schemas.openxmlformats.org/markup-compatibility/2006" xmlns:a14="http://schemas.microsoft.com/office/drawing/2010/main">
+        <mc:Choice Requires="a14">
           <p:sp>
             <p:nvSpPr>
               <p:cNvPr id="8" name="CaixaDeTexto 7">
@@ -24265,7 +24267,7 @@
             </p:txBody>
           </p:sp>
         </mc:Choice>
-        <mc:Fallback>
+        <mc:Fallback xmlns="">
           <p:sp>
             <p:nvSpPr>
               <p:cNvPr id="8" name="CaixaDeTexto 7">
@@ -24310,8 +24312,8 @@
           </p:sp>
         </mc:Fallback>
       </mc:AlternateContent>
-      <mc:AlternateContent xmlns:mc="http://schemas.openxmlformats.org/markup-compatibility/2006">
-        <mc:Choice xmlns:a14="http://schemas.microsoft.com/office/drawing/2010/main" Requires="a14">
+      <mc:AlternateContent xmlns:mc="http://schemas.openxmlformats.org/markup-compatibility/2006" xmlns:a14="http://schemas.microsoft.com/office/drawing/2010/main">
+        <mc:Choice Requires="a14">
           <p:sp>
             <p:nvSpPr>
               <p:cNvPr id="12" name="CaixaDeTexto 11">
@@ -24465,7 +24467,7 @@
             </p:txBody>
           </p:sp>
         </mc:Choice>
-        <mc:Fallback>
+        <mc:Fallback xmlns="">
           <p:sp>
             <p:nvSpPr>
               <p:cNvPr id="12" name="CaixaDeTexto 11">
@@ -25102,8 +25104,8 @@
           </a:p>
         </p:txBody>
       </p:sp>
-      <mc:AlternateContent xmlns:mc="http://schemas.openxmlformats.org/markup-compatibility/2006">
-        <mc:Choice xmlns:a14="http://schemas.microsoft.com/office/drawing/2010/main" Requires="a14">
+      <mc:AlternateContent xmlns:mc="http://schemas.openxmlformats.org/markup-compatibility/2006" xmlns:a14="http://schemas.microsoft.com/office/drawing/2010/main">
+        <mc:Choice Requires="a14">
           <p:sp>
             <p:nvSpPr>
               <p:cNvPr id="2" name="CaixaDeTexto 1">
@@ -25132,6 +25134,7 @@
               </a:bodyPr>
               <a:lstStyle/>
               <a:p>
+                <a:pPr/>
                 <a14:m>
                   <m:oMathPara xmlns:m="http://schemas.openxmlformats.org/officeDocument/2006/math">
                     <m:oMathParaPr>
@@ -25220,7 +25223,7 @@
             </p:txBody>
           </p:sp>
         </mc:Choice>
-        <mc:Fallback>
+        <mc:Fallback xmlns="">
           <p:sp>
             <p:nvSpPr>
               <p:cNvPr id="2" name="CaixaDeTexto 1">
@@ -36035,7 +36038,7 @@
                 <a:latin typeface="Segoe UI" panose="020B0502040204020203" pitchFamily="34" charset="0"/>
                 <a:cs typeface="Segoe UI" panose="020B0502040204020203" pitchFamily="34" charset="0"/>
               </a:rPr>
-              <a:t>?</a:t>
+              <a:t>?)</a:t>
             </a:r>
           </a:p>
           <a:p>
@@ -36069,7 +36072,21 @@
                 <a:latin typeface="Segoe UI" panose="020B0502040204020203" pitchFamily="34" charset="0"/>
                 <a:cs typeface="Segoe UI" panose="020B0502040204020203" pitchFamily="34" charset="0"/>
               </a:rPr>
-              <a:t> para detector </a:t>
+              <a:t> para </a:t>
+            </a:r>
+            <a:r>
+              <a:rPr lang="en-US" altLang="ko-KR" sz="1600" dirty="0" err="1">
+                <a:latin typeface="Segoe UI" panose="020B0502040204020203" pitchFamily="34" charset="0"/>
+                <a:cs typeface="Segoe UI" panose="020B0502040204020203" pitchFamily="34" charset="0"/>
+              </a:rPr>
+              <a:t>detectar</a:t>
+            </a:r>
+            <a:r>
+              <a:rPr lang="en-US" altLang="ko-KR" sz="1600" dirty="0">
+                <a:latin typeface="Segoe UI" panose="020B0502040204020203" pitchFamily="34" charset="0"/>
+                <a:cs typeface="Segoe UI" panose="020B0502040204020203" pitchFamily="34" charset="0"/>
+              </a:rPr>
+              <a:t> </a:t>
             </a:r>
             <a:r>
               <a:rPr lang="en-US" altLang="ko-KR" sz="1600" dirty="0" err="1">

</xml_diff>